<commit_message>
Moved files from Data to Code. Added some papers about IMU sensors. Created Jupyter labs for us to begin coding.
We have successfully loaded the Sendai map and GPS data in Jupyter. The next step is to implement map matching algorithms-- first we need to apply FMM to what we currently have, and then we can begin implementing our own.
</commit_message>
<xml_diff>
--- a/220620_g-RIPS_introduction.pptx
+++ b/220620_g-RIPS_introduction.pptx
@@ -4198,7 +4198,7 @@
             <a:fld id="{8EF91EEF-4211-495F-9446-6920F40F4AD4}" type="datetime1">
               <a:rPr kumimoji="1" lang="ja-JP" altLang="en-US" smtClean="0"/>
               <a:pPr/>
-              <a:t>2022/6/17</a:t>
+              <a:t>2022/6/21</a:t>
             </a:fld>
             <a:endParaRPr kumimoji="1" lang="ja-JP" altLang="en-US" dirty="0"/>
           </a:p>
@@ -4440,7 +4440,7 @@
             <a:fld id="{293C4DAC-43D7-4D81-9C39-90514BC9E9F0}" type="datetime1">
               <a:rPr kumimoji="1" lang="ja-JP" altLang="en-US" smtClean="0"/>
               <a:pPr/>
-              <a:t>2022/6/17</a:t>
+              <a:t>2022/6/21</a:t>
             </a:fld>
             <a:endParaRPr kumimoji="1" lang="ja-JP" altLang="en-US" dirty="0"/>
           </a:p>
@@ -4682,7 +4682,7 @@
             <a:fld id="{5C04899A-FA18-4ED4-BEA9-F4F6C0438376}" type="datetime1">
               <a:rPr kumimoji="1" lang="ja-JP" altLang="en-US" smtClean="0"/>
               <a:pPr/>
-              <a:t>2022/6/17</a:t>
+              <a:t>2022/6/21</a:t>
             </a:fld>
             <a:endParaRPr kumimoji="1" lang="ja-JP" altLang="en-US" dirty="0"/>
           </a:p>
@@ -5141,7 +5141,7 @@
             <a:fld id="{69C33197-9AC8-4BF9-9D55-A2CE29E5D1F4}" type="datetime1">
               <a:rPr kumimoji="1" lang="ja-JP" altLang="en-US" smtClean="0"/>
               <a:pPr/>
-              <a:t>2022/6/17</a:t>
+              <a:t>2022/6/21</a:t>
             </a:fld>
             <a:endParaRPr kumimoji="1" lang="ja-JP" altLang="en-US" dirty="0"/>
           </a:p>
@@ -5418,7 +5418,7 @@
             <a:fld id="{7483408E-0163-4893-A911-8913199E85AE}" type="datetime1">
               <a:rPr kumimoji="1" lang="ja-JP" altLang="en-US" smtClean="0"/>
               <a:pPr/>
-              <a:t>2022/6/17</a:t>
+              <a:t>2022/6/21</a:t>
             </a:fld>
             <a:endParaRPr kumimoji="1" lang="ja-JP" altLang="en-US" dirty="0"/>
           </a:p>
@@ -5807,7 +5807,7 @@
             <a:fld id="{8205094E-C5F9-4008-8DBB-939374151134}" type="datetime1">
               <a:rPr kumimoji="1" lang="ja-JP" altLang="en-US" smtClean="0"/>
               <a:pPr/>
-              <a:t>2022/6/17</a:t>
+              <a:t>2022/6/21</a:t>
             </a:fld>
             <a:endParaRPr kumimoji="1" lang="ja-JP" altLang="en-US" dirty="0"/>
           </a:p>
@@ -6336,7 +6336,7 @@
             <a:fld id="{67F2E4E1-33C6-4AB7-A211-C1341055302E}" type="datetime1">
               <a:rPr kumimoji="1" lang="ja-JP" altLang="en-US" smtClean="0"/>
               <a:pPr/>
-              <a:t>2022/6/17</a:t>
+              <a:t>2022/6/21</a:t>
             </a:fld>
             <a:endParaRPr kumimoji="1" lang="ja-JP" altLang="en-US" dirty="0"/>
           </a:p>
@@ -6487,7 +6487,7 @@
             <a:fld id="{CD7A568A-9CB2-4775-AE5B-BAAFB6C6C26B}" type="datetime1">
               <a:rPr kumimoji="1" lang="ja-JP" altLang="en-US" smtClean="0"/>
               <a:pPr/>
-              <a:t>2022/6/17</a:t>
+              <a:t>2022/6/21</a:t>
             </a:fld>
             <a:endParaRPr kumimoji="1" lang="ja-JP" altLang="en-US" dirty="0"/>
           </a:p>
@@ -6608,7 +6608,7 @@
             <a:fld id="{95F09A4A-C393-4680-B40A-19786C1730B9}" type="datetime1">
               <a:rPr kumimoji="1" lang="ja-JP" altLang="en-US" smtClean="0"/>
               <a:pPr/>
-              <a:t>2022/6/17</a:t>
+              <a:t>2022/6/21</a:t>
             </a:fld>
             <a:endParaRPr kumimoji="1" lang="ja-JP" altLang="en-US" dirty="0"/>
           </a:p>
@@ -6950,7 +6950,7 @@
             <a:fld id="{7E4AA604-BB55-46C2-B2DE-E224E81897B3}" type="datetime1">
               <a:rPr kumimoji="1" lang="ja-JP" altLang="en-US" smtClean="0"/>
               <a:pPr/>
-              <a:t>2022/6/17</a:t>
+              <a:t>2022/6/21</a:t>
             </a:fld>
             <a:endParaRPr kumimoji="1" lang="ja-JP" altLang="en-US" dirty="0"/>
           </a:p>
@@ -7241,7 +7241,7 @@
             <a:fld id="{249AAE6C-ED4E-42EC-9E26-3FB9175827F7}" type="datetime1">
               <a:rPr kumimoji="1" lang="ja-JP" altLang="en-US" smtClean="0"/>
               <a:pPr/>
-              <a:t>2022/6/17</a:t>
+              <a:t>2022/6/21</a:t>
             </a:fld>
             <a:endParaRPr kumimoji="1" lang="ja-JP" altLang="en-US" dirty="0"/>
           </a:p>

</xml_diff>